<commit_message>
Young homerun and strikeour  to win relation
</commit_message>
<xml_diff>
--- a/ group Project -Presentation.pptx
+++ b/ group Project -Presentation.pptx
@@ -5,7 +5,12 @@
     <p:sldMasterId id="2147483648" r:id="rId1"/>
   </p:sldMasterIdLst>
   <p:sldIdLst>
-    <p:sldId id="256" r:id="rId2"/>
+    <p:sldId id="261" r:id="rId2"/>
+    <p:sldId id="258" r:id="rId3"/>
+    <p:sldId id="257" r:id="rId4"/>
+    <p:sldId id="259" r:id="rId5"/>
+    <p:sldId id="262" r:id="rId6"/>
+    <p:sldId id="256" r:id="rId7"/>
   </p:sldIdLst>
   <p:sldSz cx="12192000" cy="6858000"/>
   <p:notesSz cx="6858000" cy="9144000"/>
@@ -261,7 +266,7 @@
           <a:p>
             <a:fld id="{E5ABCFFC-9D78-1E46-8A03-FDDABF80F747}" type="datetimeFigureOut">
               <a:rPr lang="en-US" smtClean="0"/>
-              <a:t>1/6/20</a:t>
+              <a:t>1/8/20</a:t>
             </a:fld>
             <a:endParaRPr lang="en-US"/>
           </a:p>
@@ -461,7 +466,7 @@
           <a:p>
             <a:fld id="{E5ABCFFC-9D78-1E46-8A03-FDDABF80F747}" type="datetimeFigureOut">
               <a:rPr lang="en-US" smtClean="0"/>
-              <a:t>1/6/20</a:t>
+              <a:t>1/8/20</a:t>
             </a:fld>
             <a:endParaRPr lang="en-US"/>
           </a:p>
@@ -671,7 +676,7 @@
           <a:p>
             <a:fld id="{E5ABCFFC-9D78-1E46-8A03-FDDABF80F747}" type="datetimeFigureOut">
               <a:rPr lang="en-US" smtClean="0"/>
-              <a:t>1/6/20</a:t>
+              <a:t>1/8/20</a:t>
             </a:fld>
             <a:endParaRPr lang="en-US"/>
           </a:p>
@@ -871,7 +876,7 @@
           <a:p>
             <a:fld id="{E5ABCFFC-9D78-1E46-8A03-FDDABF80F747}" type="datetimeFigureOut">
               <a:rPr lang="en-US" smtClean="0"/>
-              <a:t>1/6/20</a:t>
+              <a:t>1/8/20</a:t>
             </a:fld>
             <a:endParaRPr lang="en-US"/>
           </a:p>
@@ -1147,7 +1152,7 @@
           <a:p>
             <a:fld id="{E5ABCFFC-9D78-1E46-8A03-FDDABF80F747}" type="datetimeFigureOut">
               <a:rPr lang="en-US" smtClean="0"/>
-              <a:t>1/6/20</a:t>
+              <a:t>1/8/20</a:t>
             </a:fld>
             <a:endParaRPr lang="en-US"/>
           </a:p>
@@ -1415,7 +1420,7 @@
           <a:p>
             <a:fld id="{E5ABCFFC-9D78-1E46-8A03-FDDABF80F747}" type="datetimeFigureOut">
               <a:rPr lang="en-US" smtClean="0"/>
-              <a:t>1/6/20</a:t>
+              <a:t>1/8/20</a:t>
             </a:fld>
             <a:endParaRPr lang="en-US"/>
           </a:p>
@@ -1830,7 +1835,7 @@
           <a:p>
             <a:fld id="{E5ABCFFC-9D78-1E46-8A03-FDDABF80F747}" type="datetimeFigureOut">
               <a:rPr lang="en-US" smtClean="0"/>
-              <a:t>1/6/20</a:t>
+              <a:t>1/8/20</a:t>
             </a:fld>
             <a:endParaRPr lang="en-US"/>
           </a:p>
@@ -1972,7 +1977,7 @@
           <a:p>
             <a:fld id="{E5ABCFFC-9D78-1E46-8A03-FDDABF80F747}" type="datetimeFigureOut">
               <a:rPr lang="en-US" smtClean="0"/>
-              <a:t>1/6/20</a:t>
+              <a:t>1/8/20</a:t>
             </a:fld>
             <a:endParaRPr lang="en-US"/>
           </a:p>
@@ -2085,7 +2090,7 @@
           <a:p>
             <a:fld id="{E5ABCFFC-9D78-1E46-8A03-FDDABF80F747}" type="datetimeFigureOut">
               <a:rPr lang="en-US" smtClean="0"/>
-              <a:t>1/6/20</a:t>
+              <a:t>1/8/20</a:t>
             </a:fld>
             <a:endParaRPr lang="en-US"/>
           </a:p>
@@ -2398,7 +2403,7 @@
           <a:p>
             <a:fld id="{E5ABCFFC-9D78-1E46-8A03-FDDABF80F747}" type="datetimeFigureOut">
               <a:rPr lang="en-US" smtClean="0"/>
-              <a:t>1/6/20</a:t>
+              <a:t>1/8/20</a:t>
             </a:fld>
             <a:endParaRPr lang="en-US"/>
           </a:p>
@@ -2687,7 +2692,7 @@
           <a:p>
             <a:fld id="{E5ABCFFC-9D78-1E46-8A03-FDDABF80F747}" type="datetimeFigureOut">
               <a:rPr lang="en-US" smtClean="0"/>
-              <a:t>1/6/20</a:t>
+              <a:t>1/8/20</a:t>
             </a:fld>
             <a:endParaRPr lang="en-US"/>
           </a:p>
@@ -2930,7 +2935,7 @@
           <a:p>
             <a:fld id="{E5ABCFFC-9D78-1E46-8A03-FDDABF80F747}" type="datetimeFigureOut">
               <a:rPr lang="en-US" smtClean="0"/>
-              <a:t>1/6/20</a:t>
+              <a:t>1/8/20</a:t>
             </a:fld>
             <a:endParaRPr lang="en-US"/>
           </a:p>
@@ -3349,52 +3354,149 @@
       </p:grpSpPr>
       <p:sp>
         <p:nvSpPr>
-          <p:cNvPr id="3" name="Subtitle 2">
-            <a:extLst>
-              <a:ext uri="{FF2B5EF4-FFF2-40B4-BE49-F238E27FC236}">
-                <a16:creationId xmlns:a16="http://schemas.microsoft.com/office/drawing/2014/main" id="{A316AA91-716F-204E-858C-904CF2B43D72}"/>
-              </a:ext>
-            </a:extLst>
-          </p:cNvPr>
-          <p:cNvSpPr>
-            <a:spLocks noGrp="1"/>
-          </p:cNvSpPr>
-          <p:nvPr>
-            <p:ph type="subTitle" idx="1"/>
-          </p:nvPr>
-        </p:nvSpPr>
-        <p:spPr>
-          <a:xfrm>
-            <a:off x="1524000" y="411423"/>
-            <a:ext cx="8977313" cy="1260215"/>
-          </a:xfrm>
-        </p:spPr>
-        <p:txBody>
-          <a:bodyPr/>
-          <a:lstStyle/>
-          <a:p>
-            <a:r>
-              <a:rPr lang="en-US"/>
-              <a:t>Prediction Performance by Lookback Window </a:t>
-            </a:r>
-            <a:r>
-              <a:rPr lang="en-US" dirty="0"/>
-              <a:t>L</a:t>
-            </a:r>
-            <a:r>
-              <a:rPr lang="en-US"/>
-              <a:t>ength</a:t>
-            </a:r>
+          <p:cNvPr id="2" name="Title 1">
+            <a:extLst>
+              <a:ext uri="{FF2B5EF4-FFF2-40B4-BE49-F238E27FC236}">
+                <a16:creationId xmlns:a16="http://schemas.microsoft.com/office/drawing/2014/main" id="{D395A3C0-4846-F144-BBC8-65B87BE1A09F}"/>
+              </a:ext>
+            </a:extLst>
+          </p:cNvPr>
+          <p:cNvSpPr>
+            <a:spLocks noGrp="1"/>
+          </p:cNvSpPr>
+          <p:nvPr>
+            <p:ph type="title"/>
+          </p:nvPr>
+        </p:nvSpPr>
+        <p:spPr/>
+        <p:txBody>
+          <a:bodyPr/>
+          <a:lstStyle/>
+          <a:p>
+            <a:pPr algn="ctr"/>
+            <a:r>
+              <a:rPr lang="en-US" dirty="0">
+                <a:latin typeface="Arial" panose="020B0604020202020204" pitchFamily="34" charset="0"/>
+                <a:cs typeface="Arial" panose="020B0604020202020204" pitchFamily="34" charset="0"/>
+              </a:rPr>
+              <a:t>MLB Game Winner Predictor</a:t>
+            </a:r>
+            <a:br>
+              <a:rPr lang="en-US" dirty="0">
+                <a:latin typeface="Arial" panose="020B0604020202020204" pitchFamily="34" charset="0"/>
+                <a:cs typeface="Arial" panose="020B0604020202020204" pitchFamily="34" charset="0"/>
+              </a:rPr>
+            </a:br>
+            <a:endParaRPr lang="en-US" dirty="0"/>
+          </a:p>
+        </p:txBody>
+      </p:sp>
+      <p:sp>
+        <p:nvSpPr>
+          <p:cNvPr id="3" name="Content Placeholder 2">
+            <a:extLst>
+              <a:ext uri="{FF2B5EF4-FFF2-40B4-BE49-F238E27FC236}">
+                <a16:creationId xmlns:a16="http://schemas.microsoft.com/office/drawing/2014/main" id="{8F85D975-58AA-DE44-837C-C7F09F53F3F4}"/>
+              </a:ext>
+            </a:extLst>
+          </p:cNvPr>
+          <p:cNvSpPr>
+            <a:spLocks noGrp="1"/>
+          </p:cNvSpPr>
+          <p:nvPr>
+            <p:ph idx="1"/>
+          </p:nvPr>
+        </p:nvSpPr>
+        <p:spPr/>
+        <p:txBody>
+          <a:bodyPr/>
+          <a:lstStyle/>
+          <a:p>
+            <a:pPr marL="0" indent="0" algn="ctr">
+              <a:buNone/>
+            </a:pPr>
+            <a:r>
+              <a:rPr lang="en-US" dirty="0">
+                <a:latin typeface="Arial" panose="020B0604020202020204" pitchFamily="34" charset="0"/>
+                <a:cs typeface="Arial" panose="020B0604020202020204" pitchFamily="34" charset="0"/>
+              </a:rPr>
+              <a:t>UCSD Data Science Bootcamp Project 1, 01/11/2020</a:t>
+            </a:r>
+          </a:p>
+          <a:p>
+            <a:pPr marL="0" indent="0" algn="ctr">
+              <a:buNone/>
+            </a:pPr>
+            <a:endParaRPr lang="en-US" dirty="0">
+              <a:latin typeface="Arial" panose="020B0604020202020204" pitchFamily="34" charset="0"/>
+              <a:cs typeface="Arial" panose="020B0604020202020204" pitchFamily="34" charset="0"/>
+            </a:endParaRPr>
+          </a:p>
+          <a:p>
+            <a:pPr marL="0" indent="0" algn="ctr">
+              <a:buNone/>
+            </a:pPr>
+            <a:r>
+              <a:rPr lang="en-US" dirty="0">
+                <a:latin typeface="Arial" panose="020B0604020202020204" pitchFamily="34" charset="0"/>
+                <a:cs typeface="Arial" panose="020B0604020202020204" pitchFamily="34" charset="0"/>
+              </a:rPr>
+              <a:t>Alexis Perumal</a:t>
+            </a:r>
+          </a:p>
+          <a:p>
+            <a:pPr marL="0" indent="0" algn="ctr">
+              <a:buNone/>
+            </a:pPr>
+            <a:r>
+              <a:rPr lang="en-US" dirty="0" err="1">
+                <a:latin typeface="Arial" panose="020B0604020202020204" pitchFamily="34" charset="0"/>
+                <a:cs typeface="Arial" panose="020B0604020202020204" pitchFamily="34" charset="0"/>
+              </a:rPr>
+              <a:t>Venkateswarlu</a:t>
+            </a:r>
+            <a:r>
+              <a:rPr lang="en-US" dirty="0">
+                <a:latin typeface="Arial" panose="020B0604020202020204" pitchFamily="34" charset="0"/>
+                <a:cs typeface="Arial" panose="020B0604020202020204" pitchFamily="34" charset="0"/>
+              </a:rPr>
+              <a:t> </a:t>
+            </a:r>
+            <a:r>
+              <a:rPr lang="en-US" dirty="0" err="1">
+                <a:latin typeface="Arial" panose="020B0604020202020204" pitchFamily="34" charset="0"/>
+                <a:cs typeface="Arial" panose="020B0604020202020204" pitchFamily="34" charset="0"/>
+              </a:rPr>
+              <a:t>Pinnika</a:t>
+            </a:r>
+            <a:endParaRPr lang="en-US" dirty="0">
+              <a:latin typeface="Arial" panose="020B0604020202020204" pitchFamily="34" charset="0"/>
+              <a:cs typeface="Arial" panose="020B0604020202020204" pitchFamily="34" charset="0"/>
+            </a:endParaRPr>
+          </a:p>
+          <a:p>
+            <a:pPr marL="0" indent="0" algn="ctr">
+              <a:buNone/>
+            </a:pPr>
+            <a:r>
+              <a:rPr lang="en-US" dirty="0">
+                <a:latin typeface="Arial" panose="020B0604020202020204" pitchFamily="34" charset="0"/>
+                <a:cs typeface="Arial" panose="020B0604020202020204" pitchFamily="34" charset="0"/>
+              </a:rPr>
+              <a:t>Young You</a:t>
+            </a:r>
+          </a:p>
+          <a:p>
             <a:endParaRPr lang="en-US" dirty="0"/>
           </a:p>
         </p:txBody>
       </p:sp>
       <p:pic>
         <p:nvPicPr>
-          <p:cNvPr id="5" name="Picture 4">
-            <a:extLst>
-              <a:ext uri="{FF2B5EF4-FFF2-40B4-BE49-F238E27FC236}">
-                <a16:creationId xmlns:a16="http://schemas.microsoft.com/office/drawing/2014/main" id="{EB70FA39-A8E5-ED4C-99CF-64036E269F4A}"/>
+          <p:cNvPr id="4" name="Picture 3">
+            <a:extLst>
+              <a:ext uri="{FF2B5EF4-FFF2-40B4-BE49-F238E27FC236}">
+                <a16:creationId xmlns:a16="http://schemas.microsoft.com/office/drawing/2014/main" id="{2863A1AF-1B87-7749-9197-856BF75D5705}"/>
               </a:ext>
             </a:extLst>
           </p:cNvPr>
@@ -3411,58 +3513,786 @@
         </p:blipFill>
         <p:spPr>
           <a:xfrm>
-            <a:off x="1376362" y="1315243"/>
-            <a:ext cx="6586777" cy="4227513"/>
+            <a:off x="4139656" y="4495800"/>
+            <a:ext cx="4330700" cy="2362200"/>
           </a:xfrm>
           <a:prstGeom prst="rect">
             <a:avLst/>
           </a:prstGeom>
         </p:spPr>
       </p:pic>
-      <p:sp>
-        <p:nvSpPr>
-          <p:cNvPr id="6" name="TextBox 5">
-            <a:extLst>
-              <a:ext uri="{FF2B5EF4-FFF2-40B4-BE49-F238E27FC236}">
-                <a16:creationId xmlns:a16="http://schemas.microsoft.com/office/drawing/2014/main" id="{8AA0129B-A8AE-614D-80A2-8F4A7C297C41}"/>
-              </a:ext>
-            </a:extLst>
-          </p:cNvPr>
-          <p:cNvSpPr txBox="1"/>
+    </p:spTree>
+    <p:extLst>
+      <p:ext uri="{BB962C8B-B14F-4D97-AF65-F5344CB8AC3E}">
+        <p14:creationId xmlns:p14="http://schemas.microsoft.com/office/powerpoint/2010/main" val="3718537542"/>
+      </p:ext>
+    </p:extLst>
+  </p:cSld>
+  <p:clrMapOvr>
+    <a:masterClrMapping/>
+  </p:clrMapOvr>
+</p:sld>
+</file>
+
+<file path=ppt/slides/slide2.xml><?xml version="1.0" encoding="utf-8"?>
+<p:sld xmlns:a="http://schemas.openxmlformats.org/drawingml/2006/main" xmlns:r="http://schemas.openxmlformats.org/officeDocument/2006/relationships" xmlns:p="http://schemas.openxmlformats.org/presentationml/2006/main">
+  <p:cSld>
+    <p:spTree>
+      <p:nvGrpSpPr>
+        <p:cNvPr id="1" name=""/>
+        <p:cNvGrpSpPr/>
+        <p:nvPr/>
+      </p:nvGrpSpPr>
+      <p:grpSpPr>
+        <a:xfrm>
+          <a:off x="0" y="0"/>
+          <a:ext cx="0" cy="0"/>
+          <a:chOff x="0" y="0"/>
+          <a:chExt cx="0" cy="0"/>
+        </a:xfrm>
+      </p:grpSpPr>
+      <p:sp>
+        <p:nvSpPr>
+          <p:cNvPr id="4" name="Rectangle 3">
+            <a:extLst>
+              <a:ext uri="{FF2B5EF4-FFF2-40B4-BE49-F238E27FC236}">
+                <a16:creationId xmlns:a16="http://schemas.microsoft.com/office/drawing/2014/main" id="{F8A7BE89-8B36-3145-AC14-B18E6B967D1A}"/>
+              </a:ext>
+            </a:extLst>
+          </p:cNvPr>
+          <p:cNvSpPr/>
           <p:nvPr/>
         </p:nvSpPr>
         <p:spPr>
           <a:xfrm>
-            <a:off x="8172449" y="1530157"/>
-            <a:ext cx="3414713" cy="923330"/>
+            <a:off x="1063084" y="223023"/>
+            <a:ext cx="9419061" cy="6278642"/>
           </a:xfrm>
           <a:prstGeom prst="rect">
             <a:avLst/>
           </a:prstGeom>
-          <a:noFill/>
         </p:spPr>
         <p:txBody>
-          <a:bodyPr wrap="square" rtlCol="0">
+          <a:bodyPr wrap="square">
             <a:spAutoFit/>
           </a:bodyPr>
           <a:lstStyle/>
           <a:p>
+            <a:endParaRPr lang="en-US" dirty="0">
+              <a:latin typeface="Arial" panose="020B0604020202020204" pitchFamily="34" charset="0"/>
+              <a:cs typeface="Arial" panose="020B0604020202020204" pitchFamily="34" charset="0"/>
+            </a:endParaRPr>
+          </a:p>
+          <a:p>
+            <a:r>
+              <a:rPr lang="en-US" sz="2000" b="1" dirty="0">
+                <a:latin typeface="Arial" panose="020B0604020202020204" pitchFamily="34" charset="0"/>
+                <a:cs typeface="Arial" panose="020B0604020202020204" pitchFamily="34" charset="0"/>
+              </a:rPr>
+              <a:t>Project Objective:</a:t>
+            </a:r>
+          </a:p>
+          <a:p>
             <a:r>
               <a:rPr lang="en-US" dirty="0"/>
-              <a:t>Methods</a:t>
-            </a:r>
-          </a:p>
-          <a:p>
+              <a:t>Build a predictive model that can predict the winner of an MLB game, before it starts.</a:t>
+            </a:r>
+          </a:p>
+          <a:p>
+            <a:endParaRPr lang="en-US" dirty="0">
+              <a:latin typeface="Arial" panose="020B0604020202020204" pitchFamily="34" charset="0"/>
+              <a:cs typeface="Arial" panose="020B0604020202020204" pitchFamily="34" charset="0"/>
+            </a:endParaRPr>
+          </a:p>
+          <a:p>
+            <a:r>
+              <a:rPr lang="en-US" sz="2000" b="1" dirty="0">
+                <a:latin typeface="Arial" panose="020B0604020202020204" pitchFamily="34" charset="0"/>
+                <a:cs typeface="Arial" panose="020B0604020202020204" pitchFamily="34" charset="0"/>
+              </a:rPr>
+              <a:t>Project Description/Outline:</a:t>
+            </a:r>
+          </a:p>
+          <a:p>
+            <a:pPr marL="285750" indent="-285750">
+              <a:buFont typeface="Arial" panose="020B0604020202020204" pitchFamily="34" charset="0"/>
+              <a:buChar char="•"/>
+            </a:pPr>
             <a:r>
               <a:rPr lang="en-US" dirty="0"/>
-              <a:t>*</a:t>
-            </a:r>
-          </a:p>
-          <a:p>
+              <a:t>Brainstorm the concept</a:t>
+            </a:r>
+          </a:p>
+          <a:p>
+            <a:pPr marL="285750" indent="-285750">
+              <a:buFont typeface="Arial" panose="020B0604020202020204" pitchFamily="34" charset="0"/>
+              <a:buChar char="•"/>
+            </a:pPr>
             <a:r>
               <a:rPr lang="en-US" dirty="0"/>
-              <a:t>*</a:t>
-            </a:r>
+              <a:t>Browse the dataset</a:t>
+            </a:r>
+          </a:p>
+          <a:p>
+            <a:pPr marL="285750" indent="-285750">
+              <a:buFont typeface="Arial" panose="020B0604020202020204" pitchFamily="34" charset="0"/>
+              <a:buChar char="•"/>
+            </a:pPr>
+            <a:r>
+              <a:rPr lang="en-US" dirty="0"/>
+              <a:t>Evaluate which factors drive runs</a:t>
+            </a:r>
+          </a:p>
+          <a:p>
+            <a:pPr marL="285750" indent="-285750">
+              <a:buFont typeface="Arial" panose="020B0604020202020204" pitchFamily="34" charset="0"/>
+              <a:buChar char="•"/>
+            </a:pPr>
+            <a:r>
+              <a:rPr lang="en-US" dirty="0"/>
+              <a:t>Build a simple 1 or 2 factor predictive model. Evaluate it.</a:t>
+            </a:r>
+          </a:p>
+          <a:p>
+            <a:endParaRPr lang="en-US" dirty="0">
+              <a:latin typeface="Arial" panose="020B0604020202020204" pitchFamily="34" charset="0"/>
+              <a:cs typeface="Arial" panose="020B0604020202020204" pitchFamily="34" charset="0"/>
+            </a:endParaRPr>
+          </a:p>
+          <a:p>
+            <a:r>
+              <a:rPr lang="en-US" b="1" dirty="0"/>
+              <a:t>Research Questions to Answer</a:t>
+            </a:r>
+          </a:p>
+          <a:p>
+            <a:pPr marL="285750" indent="-285750">
+              <a:buFont typeface="Arial" panose="020B0604020202020204" pitchFamily="34" charset="0"/>
+              <a:buChar char="•"/>
+            </a:pPr>
+            <a:r>
+              <a:rPr lang="en-US" dirty="0"/>
+              <a:t>What factors drive runs and game outcomes?</a:t>
+            </a:r>
+          </a:p>
+          <a:p>
+            <a:pPr marL="285750" indent="-285750">
+              <a:buFont typeface="Arial" panose="020B0604020202020204" pitchFamily="34" charset="0"/>
+              <a:buChar char="•"/>
+            </a:pPr>
+            <a:r>
+              <a:rPr lang="en-US" dirty="0"/>
+              <a:t>What is a reasonable expectation for predictive accuracy? Presumably 50% accurate is easy to do (random should do that). </a:t>
+            </a:r>
+          </a:p>
+          <a:p>
+            <a:endParaRPr lang="en-US" dirty="0">
+              <a:latin typeface="Arial" panose="020B0604020202020204" pitchFamily="34" charset="0"/>
+              <a:cs typeface="Arial" panose="020B0604020202020204" pitchFamily="34" charset="0"/>
+            </a:endParaRPr>
+          </a:p>
+          <a:p>
+            <a:r>
+              <a:rPr lang="en-US" sz="2000" b="1" dirty="0">
+                <a:latin typeface="Arial" panose="020B0604020202020204" pitchFamily="34" charset="0"/>
+                <a:cs typeface="Arial" panose="020B0604020202020204" pitchFamily="34" charset="0"/>
+              </a:rPr>
+              <a:t>Datasets used:</a:t>
+            </a:r>
+            <a:endParaRPr lang="en-US" sz="2000" dirty="0">
+              <a:latin typeface="Arial" panose="020B0604020202020204" pitchFamily="34" charset="0"/>
+              <a:cs typeface="Arial" panose="020B0604020202020204" pitchFamily="34" charset="0"/>
+            </a:endParaRPr>
+          </a:p>
+          <a:p>
+            <a:r>
+              <a:rPr lang="en-US" dirty="0" err="1">
+                <a:latin typeface="Arial" panose="020B0604020202020204" pitchFamily="34" charset="0"/>
+                <a:cs typeface="Arial" panose="020B0604020202020204" pitchFamily="34" charset="0"/>
+              </a:rPr>
+              <a:t>SeanLahman.com</a:t>
+            </a:r>
+            <a:endParaRPr lang="en-US" dirty="0">
+              <a:latin typeface="Arial" panose="020B0604020202020204" pitchFamily="34" charset="0"/>
+              <a:cs typeface="Arial" panose="020B0604020202020204" pitchFamily="34" charset="0"/>
+            </a:endParaRPr>
+          </a:p>
+          <a:p>
+            <a:pPr lvl="1"/>
+            <a:r>
+              <a:rPr lang="en-US" dirty="0">
+                <a:latin typeface="Arial" panose="020B0604020202020204" pitchFamily="34" charset="0"/>
+                <a:cs typeface="Arial" panose="020B0604020202020204" pitchFamily="34" charset="0"/>
+              </a:rPr>
+              <a:t>-provides rich baseball game outcome for every  MLB game going back to 1881. </a:t>
+            </a:r>
+          </a:p>
+          <a:p>
+            <a:pPr lvl="1"/>
+            <a:r>
+              <a:rPr lang="en-US" dirty="0">
+                <a:latin typeface="Arial" panose="020B0604020202020204" pitchFamily="34" charset="0"/>
+                <a:cs typeface="Arial" panose="020B0604020202020204" pitchFamily="34" charset="0"/>
+              </a:rPr>
+              <a:t>-It includes game outcomes, player data, at bats, pitches.</a:t>
+            </a:r>
+          </a:p>
+          <a:p>
+            <a:pPr lvl="1"/>
+            <a:r>
+              <a:rPr lang="en-US" dirty="0">
+                <a:latin typeface="Arial" panose="020B0604020202020204" pitchFamily="34" charset="0"/>
+                <a:cs typeface="Arial" panose="020B0604020202020204" pitchFamily="34" charset="0"/>
+              </a:rPr>
+              <a:t>-It is available as a CSV file</a:t>
+            </a:r>
+            <a:endParaRPr lang="en-US" dirty="0"/>
+          </a:p>
+          <a:p>
+            <a:pPr lvl="1"/>
+            <a:endParaRPr lang="en-US" dirty="0">
+              <a:latin typeface="Arial" panose="020B0604020202020204" pitchFamily="34" charset="0"/>
+              <a:cs typeface="Arial" panose="020B0604020202020204" pitchFamily="34" charset="0"/>
+            </a:endParaRPr>
+          </a:p>
+          <a:p>
+            <a:endParaRPr lang="en-US" b="0" i="0" dirty="0">
+              <a:effectLst/>
+              <a:latin typeface="Arial" panose="020B0604020202020204" pitchFamily="34" charset="0"/>
+              <a:cs typeface="Arial" panose="020B0604020202020204" pitchFamily="34" charset="0"/>
+            </a:endParaRPr>
+          </a:p>
+        </p:txBody>
+      </p:sp>
+    </p:spTree>
+    <p:extLst>
+      <p:ext uri="{BB962C8B-B14F-4D97-AF65-F5344CB8AC3E}">
+        <p14:creationId xmlns:p14="http://schemas.microsoft.com/office/powerpoint/2010/main" val="1462753047"/>
+      </p:ext>
+    </p:extLst>
+  </p:cSld>
+  <p:clrMapOvr>
+    <a:masterClrMapping/>
+  </p:clrMapOvr>
+</p:sld>
+</file>
+
+<file path=ppt/slides/slide3.xml><?xml version="1.0" encoding="utf-8"?>
+<p:sld xmlns:a="http://schemas.openxmlformats.org/drawingml/2006/main" xmlns:r="http://schemas.openxmlformats.org/officeDocument/2006/relationships" xmlns:p="http://schemas.openxmlformats.org/presentationml/2006/main">
+  <p:cSld>
+    <p:spTree>
+      <p:nvGrpSpPr>
+        <p:cNvPr id="1" name=""/>
+        <p:cNvGrpSpPr/>
+        <p:nvPr/>
+      </p:nvGrpSpPr>
+      <p:grpSpPr>
+        <a:xfrm>
+          <a:off x="0" y="0"/>
+          <a:ext cx="0" cy="0"/>
+          <a:chOff x="0" y="0"/>
+          <a:chExt cx="0" cy="0"/>
+        </a:xfrm>
+      </p:grpSpPr>
+      <p:sp>
+        <p:nvSpPr>
+          <p:cNvPr id="4" name="Rectangle 3">
+            <a:extLst>
+              <a:ext uri="{FF2B5EF4-FFF2-40B4-BE49-F238E27FC236}">
+                <a16:creationId xmlns:a16="http://schemas.microsoft.com/office/drawing/2014/main" id="{9A3998D3-C0FD-CA45-A4B8-13159DE36BDD}"/>
+              </a:ext>
+            </a:extLst>
+          </p:cNvPr>
+          <p:cNvSpPr/>
+          <p:nvPr/>
+        </p:nvSpPr>
+        <p:spPr>
+          <a:xfrm>
+            <a:off x="1347536" y="1450654"/>
+            <a:ext cx="8791073" cy="3139321"/>
+          </a:xfrm>
+          <a:prstGeom prst="rect">
+            <a:avLst/>
+          </a:prstGeom>
+        </p:spPr>
+        <p:txBody>
+          <a:bodyPr wrap="square">
+            <a:spAutoFit/>
+          </a:bodyPr>
+          <a:lstStyle/>
+          <a:p>
+            <a:r>
+              <a:rPr lang="en-US" dirty="0"/>
+              <a:t>Objective: Read the dataset, do a simple prediction for games on a given date using data prior to that date, then and record some stats on how well it did.</a:t>
+            </a:r>
+          </a:p>
+          <a:p>
+            <a:r>
+              <a:rPr lang="en-US" dirty="0"/>
+              <a:t>1. Reads in the 2010 season as the baseline games dataset. It does some simple selection of columns and generates a few calculated fields.</a:t>
+            </a:r>
+          </a:p>
+          <a:p>
+            <a:r>
+              <a:rPr lang="en-US" dirty="0"/>
+              <a:t>2. It prompts the user to specify 'game day' which are the games it is to predict.</a:t>
+            </a:r>
+          </a:p>
+          <a:p>
+            <a:r>
+              <a:rPr lang="en-US" dirty="0"/>
+              <a:t>3. It calculates the avg net number of runs for the home team (when playing at home) and the avg net number of runs for the visiting team (when playing away).</a:t>
+            </a:r>
+          </a:p>
+          <a:p>
+            <a:r>
+              <a:rPr lang="en-US" dirty="0"/>
+              <a:t>4. For a given game, the predicted winner is the team with the greatest avg net runs  home or away (as applicable).</a:t>
+            </a:r>
+          </a:p>
+          <a:p>
+            <a:r>
+              <a:rPr lang="en-US" dirty="0"/>
+              <a:t> 5. The prediction is compared with the actual results that day, with % correct reported.</a:t>
+            </a:r>
+          </a:p>
+          <a:p>
+            <a:endParaRPr lang="en-US" dirty="0"/>
+          </a:p>
+        </p:txBody>
+      </p:sp>
+    </p:spTree>
+    <p:extLst>
+      <p:ext uri="{BB962C8B-B14F-4D97-AF65-F5344CB8AC3E}">
+        <p14:creationId xmlns:p14="http://schemas.microsoft.com/office/powerpoint/2010/main" val="1585535494"/>
+      </p:ext>
+    </p:extLst>
+  </p:cSld>
+  <p:clrMapOvr>
+    <a:masterClrMapping/>
+  </p:clrMapOvr>
+</p:sld>
+</file>
+
+<file path=ppt/slides/slide4.xml><?xml version="1.0" encoding="utf-8"?>
+<p:sld xmlns:a="http://schemas.openxmlformats.org/drawingml/2006/main" xmlns:r="http://schemas.openxmlformats.org/officeDocument/2006/relationships" xmlns:p="http://schemas.openxmlformats.org/presentationml/2006/main">
+  <p:cSld>
+    <p:spTree>
+      <p:nvGrpSpPr>
+        <p:cNvPr id="1" name=""/>
+        <p:cNvGrpSpPr/>
+        <p:nvPr/>
+      </p:nvGrpSpPr>
+      <p:grpSpPr>
+        <a:xfrm>
+          <a:off x="0" y="0"/>
+          <a:ext cx="0" cy="0"/>
+          <a:chOff x="0" y="0"/>
+          <a:chExt cx="0" cy="0"/>
+        </a:xfrm>
+      </p:grpSpPr>
+      <p:sp>
+        <p:nvSpPr>
+          <p:cNvPr id="3" name="Content Placeholder 2">
+            <a:extLst>
+              <a:ext uri="{FF2B5EF4-FFF2-40B4-BE49-F238E27FC236}">
+                <a16:creationId xmlns:a16="http://schemas.microsoft.com/office/drawing/2014/main" id="{F26611E3-2923-454A-B2E2-0FD7E69D8847}"/>
+              </a:ext>
+            </a:extLst>
+          </p:cNvPr>
+          <p:cNvSpPr>
+            <a:spLocks noGrp="1"/>
+          </p:cNvSpPr>
+          <p:nvPr>
+            <p:ph idx="1"/>
+          </p:nvPr>
+        </p:nvSpPr>
+        <p:spPr>
+          <a:xfrm>
+            <a:off x="838200" y="558299"/>
+            <a:ext cx="9335947" cy="5935098"/>
+          </a:xfrm>
+        </p:spPr>
+        <p:txBody>
+          <a:bodyPr>
+            <a:noAutofit/>
+          </a:bodyPr>
+          <a:lstStyle/>
+          <a:p>
+            <a:pPr marL="0" indent="0">
+              <a:buNone/>
+            </a:pPr>
+            <a:r>
+              <a:rPr lang="en-US" sz="1800" dirty="0"/>
+              <a:t>Proposed next steps 2:</a:t>
+            </a:r>
+          </a:p>
+          <a:p>
+            <a:pPr marL="0" indent="0">
+              <a:buNone/>
+            </a:pPr>
+            <a:r>
+              <a:rPr lang="en-US" sz="1800" dirty="0"/>
+              <a:t>1. Integrate Venkat's "</a:t>
+            </a:r>
+            <a:r>
+              <a:rPr lang="en-US" sz="1800" dirty="0" err="1"/>
+              <a:t>concat</a:t>
+            </a:r>
+            <a:r>
+              <a:rPr lang="en-US" sz="1800" dirty="0"/>
+              <a:t>" capability to combine datasets across year blocks to result</a:t>
+            </a:r>
+          </a:p>
+          <a:p>
+            <a:pPr marL="0" indent="0">
+              <a:buNone/>
+            </a:pPr>
+            <a:r>
+              <a:rPr lang="en-US" sz="1800" dirty="0"/>
+              <a:t>in a much larger dataset. Note that for development we may want to keep the dataset</a:t>
+            </a:r>
+          </a:p>
+          <a:p>
+            <a:pPr marL="0" indent="0">
+              <a:buNone/>
+            </a:pPr>
+            <a:r>
+              <a:rPr lang="en-US" sz="1800" dirty="0"/>
+              <a:t>smaller size so that it doesn't take a long time to run.</a:t>
+            </a:r>
+          </a:p>
+          <a:p>
+            <a:pPr marL="0" indent="0">
+              <a:buNone/>
+            </a:pPr>
+            <a:r>
+              <a:rPr lang="en-US" sz="1800" dirty="0"/>
+              <a:t>2. Move this out of </a:t>
+            </a:r>
+            <a:r>
+              <a:rPr lang="en-US" sz="1800" dirty="0" err="1"/>
+              <a:t>jupyter</a:t>
+            </a:r>
+            <a:r>
+              <a:rPr lang="en-US" sz="1800" dirty="0"/>
+              <a:t> notebook into standard Python and embed the prediction logic</a:t>
+            </a:r>
+          </a:p>
+          <a:p>
+            <a:pPr marL="0" indent="0">
+              <a:buNone/>
+            </a:pPr>
+            <a:r>
+              <a:rPr lang="en-US" sz="1800" dirty="0"/>
+              <a:t>into a function that can be called repeatedly with different dates.</a:t>
+            </a:r>
+          </a:p>
+          <a:p>
+            <a:pPr marL="0" indent="0">
+              <a:buNone/>
+            </a:pPr>
+            <a:r>
+              <a:rPr lang="en-US" sz="1800" dirty="0"/>
+              <a:t>3. Run trials with large numbers of dates to product large numbers of predictions and results.</a:t>
+            </a:r>
+          </a:p>
+          <a:p>
+            <a:pPr marL="0" indent="0">
+              <a:buNone/>
+            </a:pPr>
+            <a:r>
+              <a:rPr lang="en-US" sz="1800" dirty="0"/>
+              <a:t>4. Write results to a file. Possibly generate some plot of results as a function of</a:t>
+            </a:r>
+          </a:p>
+          <a:p>
+            <a:pPr marL="0" indent="0">
+              <a:buNone/>
+            </a:pPr>
+            <a:r>
+              <a:rPr lang="en-US" sz="1800" dirty="0"/>
+              <a:t>training set window size.</a:t>
+            </a:r>
+          </a:p>
+          <a:p>
+            <a:pPr marL="0" indent="0">
+              <a:buNone/>
+            </a:pPr>
+            <a:r>
+              <a:rPr lang="en-US" sz="1800" dirty="0"/>
+              <a:t>5. Start experimenting with </a:t>
+            </a:r>
+            <a:r>
+              <a:rPr lang="en-US" sz="1800" dirty="0" err="1"/>
+              <a:t>differnt</a:t>
+            </a:r>
+            <a:r>
+              <a:rPr lang="en-US" sz="1800" dirty="0"/>
+              <a:t> prediction functions, initially across individual</a:t>
+            </a:r>
+          </a:p>
+          <a:p>
+            <a:pPr marL="0" indent="0">
+              <a:buNone/>
+            </a:pPr>
+            <a:r>
+              <a:rPr lang="en-US" sz="1800" dirty="0"/>
+              <a:t>factors, and then with multiple factors.</a:t>
+            </a:r>
+          </a:p>
+          <a:p>
+            <a:pPr marL="0" indent="0">
+              <a:buNone/>
+            </a:pPr>
+            <a:r>
+              <a:rPr lang="en-US" sz="1800" dirty="0"/>
+              <a:t> 6. Consider a statistically meaningful </a:t>
+            </a:r>
+            <a:r>
+              <a:rPr lang="en-US" sz="1800" dirty="0" err="1"/>
+              <a:t>regresssion</a:t>
+            </a:r>
+            <a:r>
+              <a:rPr lang="en-US" sz="1800" dirty="0"/>
+              <a:t> analysis to select factors and training</a:t>
+            </a:r>
+          </a:p>
+          <a:p>
+            <a:pPr marL="0" indent="0">
+              <a:buNone/>
+            </a:pPr>
+            <a:r>
+              <a:rPr lang="en-US" sz="1800" dirty="0"/>
+              <a:t>set window size, by factor.</a:t>
+            </a:r>
+          </a:p>
+          <a:p>
+            <a:pPr marL="0" indent="0">
+              <a:buNone/>
+            </a:pPr>
+            <a:r>
+              <a:rPr lang="en-US" sz="1800" dirty="0"/>
+              <a:t> 7. If someone has energy, consider using a web API to hit a website with current day</a:t>
+            </a:r>
+          </a:p>
+          <a:p>
+            <a:pPr marL="0" indent="0">
+              <a:buNone/>
+            </a:pPr>
+            <a:r>
+              <a:rPr lang="en-US" sz="1800" dirty="0"/>
+              <a:t>game schedule so we can predict games more recent than the dataset.</a:t>
+            </a:r>
+          </a:p>
+        </p:txBody>
+      </p:sp>
+    </p:spTree>
+    <p:extLst>
+      <p:ext uri="{BB962C8B-B14F-4D97-AF65-F5344CB8AC3E}">
+        <p14:creationId xmlns:p14="http://schemas.microsoft.com/office/powerpoint/2010/main" val="280591435"/>
+      </p:ext>
+    </p:extLst>
+  </p:cSld>
+  <p:clrMapOvr>
+    <a:masterClrMapping/>
+  </p:clrMapOvr>
+</p:sld>
+</file>
+
+<file path=ppt/slides/slide5.xml><?xml version="1.0" encoding="utf-8"?>
+<p:sld xmlns:a="http://schemas.openxmlformats.org/drawingml/2006/main" xmlns:r="http://schemas.openxmlformats.org/officeDocument/2006/relationships" xmlns:p="http://schemas.openxmlformats.org/presentationml/2006/main">
+  <p:cSld>
+    <p:spTree>
+      <p:nvGrpSpPr>
+        <p:cNvPr id="1" name=""/>
+        <p:cNvGrpSpPr/>
+        <p:nvPr/>
+      </p:nvGrpSpPr>
+      <p:grpSpPr>
+        <a:xfrm>
+          <a:off x="0" y="0"/>
+          <a:ext cx="0" cy="0"/>
+          <a:chOff x="0" y="0"/>
+          <a:chExt cx="0" cy="0"/>
+        </a:xfrm>
+      </p:grpSpPr>
+      <p:sp>
+        <p:nvSpPr>
+          <p:cNvPr id="3" name="Content Placeholder 2">
+            <a:extLst>
+              <a:ext uri="{FF2B5EF4-FFF2-40B4-BE49-F238E27FC236}">
+                <a16:creationId xmlns:a16="http://schemas.microsoft.com/office/drawing/2014/main" id="{29F12AE4-2FD4-EF48-9833-3E249E40C44A}"/>
+              </a:ext>
+            </a:extLst>
+          </p:cNvPr>
+          <p:cNvSpPr>
+            <a:spLocks noGrp="1"/>
+          </p:cNvSpPr>
+          <p:nvPr>
+            <p:ph idx="1"/>
+          </p:nvPr>
+        </p:nvSpPr>
+        <p:spPr/>
+        <p:txBody>
+          <a:bodyPr>
+            <a:normAutofit fontScale="92500" lnSpcReduction="10000"/>
+          </a:bodyPr>
+          <a:lstStyle/>
+          <a:p>
+            <a:pPr marL="0" indent="0">
+              <a:buNone/>
+            </a:pPr>
+            <a:r>
+              <a:rPr lang="en-US" dirty="0"/>
+              <a:t>Venkat : Modified the code and included the below changes</a:t>
+            </a:r>
+          </a:p>
+          <a:p>
+            <a:pPr marL="0" indent="0">
+              <a:buNone/>
+            </a:pPr>
+            <a:r>
+              <a:rPr lang="en-US" dirty="0"/>
+              <a:t>1. Included the logic to combine all data files into one data frame</a:t>
+            </a:r>
+          </a:p>
+          <a:p>
+            <a:pPr marL="0" indent="0">
+              <a:buNone/>
+            </a:pPr>
+            <a:r>
+              <a:rPr lang="en-US" dirty="0"/>
+              <a:t>2. Included cleanup logic to clean missing data rows if any such rows exists</a:t>
+            </a:r>
+          </a:p>
+          <a:p>
+            <a:endParaRPr lang="en-US" dirty="0"/>
+          </a:p>
+          <a:p>
+            <a:pPr marL="0" indent="0">
+              <a:buNone/>
+            </a:pPr>
+            <a:r>
+              <a:rPr lang="en-US" dirty="0"/>
+              <a:t>Alexis: Extend from "hello-world" to a useful predictor harness.</a:t>
+            </a:r>
+          </a:p>
+          <a:p>
+            <a:pPr marL="0" indent="0">
+              <a:buNone/>
+            </a:pPr>
+            <a:r>
+              <a:rPr lang="en-US" dirty="0"/>
+              <a:t>Implement a window to constrain the lookback period to n gamedays.</a:t>
+            </a:r>
+          </a:p>
+          <a:p>
+            <a:pPr marL="0" indent="0">
+              <a:buNone/>
+            </a:pPr>
+            <a:endParaRPr lang="en-US" dirty="0"/>
+          </a:p>
+          <a:p>
+            <a:pPr marL="0" indent="0">
+              <a:buNone/>
+            </a:pPr>
+            <a:r>
+              <a:rPr lang="en-US" dirty="0"/>
+              <a:t>Venkat: Building the new prediction algorithm.</a:t>
+            </a:r>
+          </a:p>
+          <a:p>
+            <a:pPr marL="0" indent="0">
+              <a:buNone/>
+            </a:pPr>
+            <a:r>
+              <a:rPr lang="en-US" dirty="0"/>
+              <a:t>  Calculate Avg Net runs only for head-head teams, and see if it improves the </a:t>
+            </a:r>
+            <a:r>
+              <a:rPr lang="en-US" dirty="0" err="1"/>
+              <a:t>forecst</a:t>
+            </a:r>
+            <a:r>
+              <a:rPr lang="en-US" dirty="0"/>
+              <a:t> accuracy </a:t>
+            </a:r>
+          </a:p>
+          <a:p>
+            <a:endParaRPr lang="en-US" dirty="0"/>
+          </a:p>
+        </p:txBody>
+      </p:sp>
+    </p:spTree>
+    <p:extLst>
+      <p:ext uri="{BB962C8B-B14F-4D97-AF65-F5344CB8AC3E}">
+        <p14:creationId xmlns:p14="http://schemas.microsoft.com/office/powerpoint/2010/main" val="3836375545"/>
+      </p:ext>
+    </p:extLst>
+  </p:cSld>
+  <p:clrMapOvr>
+    <a:masterClrMapping/>
+  </p:clrMapOvr>
+</p:sld>
+</file>
+
+<file path=ppt/slides/slide6.xml><?xml version="1.0" encoding="utf-8"?>
+<p:sld xmlns:a="http://schemas.openxmlformats.org/drawingml/2006/main" xmlns:r="http://schemas.openxmlformats.org/officeDocument/2006/relationships" xmlns:p="http://schemas.openxmlformats.org/presentationml/2006/main">
+  <p:cSld>
+    <p:spTree>
+      <p:nvGrpSpPr>
+        <p:cNvPr id="1" name=""/>
+        <p:cNvGrpSpPr/>
+        <p:nvPr/>
+      </p:nvGrpSpPr>
+      <p:grpSpPr>
+        <a:xfrm>
+          <a:off x="0" y="0"/>
+          <a:ext cx="0" cy="0"/>
+          <a:chOff x="0" y="0"/>
+          <a:chExt cx="0" cy="0"/>
+        </a:xfrm>
+      </p:grpSpPr>
+      <p:sp>
+        <p:nvSpPr>
+          <p:cNvPr id="3" name="Subtitle 2">
+            <a:extLst>
+              <a:ext uri="{FF2B5EF4-FFF2-40B4-BE49-F238E27FC236}">
+                <a16:creationId xmlns:a16="http://schemas.microsoft.com/office/drawing/2014/main" id="{A316AA91-716F-204E-858C-904CF2B43D72}"/>
+              </a:ext>
+            </a:extLst>
+          </p:cNvPr>
+          <p:cNvSpPr>
+            <a:spLocks noGrp="1"/>
+          </p:cNvSpPr>
+          <p:nvPr>
+            <p:ph type="subTitle" idx="1"/>
+          </p:nvPr>
+        </p:nvSpPr>
+        <p:spPr>
+          <a:xfrm>
+            <a:off x="1524000" y="411423"/>
+            <a:ext cx="8977313" cy="1260215"/>
+          </a:xfrm>
+        </p:spPr>
+        <p:txBody>
+          <a:bodyPr/>
+          <a:lstStyle/>
+          <a:p>
+            <a:r>
+              <a:rPr lang="en-US"/>
+              <a:t>Prediction Performance by Lookback Window </a:t>
+            </a:r>
+            <a:r>
+              <a:rPr lang="en-US" dirty="0"/>
+              <a:t>L</a:t>
+            </a:r>
+            <a:r>
+              <a:rPr lang="en-US"/>
+              <a:t>ength</a:t>
+            </a:r>
+            <a:endParaRPr lang="en-US" dirty="0"/>
           </a:p>
         </p:txBody>
       </p:sp>
@@ -3480,7 +4310,7 @@
         </p:nvSpPr>
         <p:spPr>
           <a:xfrm>
-            <a:off x="8262355" y="3332467"/>
+            <a:off x="1240083" y="5428142"/>
             <a:ext cx="3234899" cy="646331"/>
           </a:xfrm>
           <a:prstGeom prst="rect">
@@ -3495,7 +4325,7 @@
           <a:lstStyle/>
           <a:p>
             <a:r>
-              <a:rPr lang="en-US" dirty="0"/>
+              <a:rPr lang="en-US" b="1" dirty="0"/>
               <a:t>Conclusion</a:t>
             </a:r>
           </a:p>
@@ -3504,6 +4334,66 @@
           </a:p>
         </p:txBody>
       </p:sp>
+      <p:pic>
+        <p:nvPicPr>
+          <p:cNvPr id="4" name="Picture 3" descr="A close up of a map&#10;&#10;Description automatically generated">
+            <a:extLst>
+              <a:ext uri="{FF2B5EF4-FFF2-40B4-BE49-F238E27FC236}">
+                <a16:creationId xmlns:a16="http://schemas.microsoft.com/office/drawing/2014/main" id="{8DB7A2EB-ABAD-FC4E-8F97-83DCF4B166A3}"/>
+              </a:ext>
+            </a:extLst>
+          </p:cNvPr>
+          <p:cNvPicPr>
+            <a:picLocks noChangeAspect="1"/>
+          </p:cNvPicPr>
+          <p:nvPr/>
+        </p:nvPicPr>
+        <p:blipFill>
+          <a:blip r:embed="rId2"/>
+          <a:stretch>
+            <a:fillRect/>
+          </a:stretch>
+        </p:blipFill>
+        <p:spPr>
+          <a:xfrm>
+            <a:off x="6051663" y="1460209"/>
+            <a:ext cx="5704765" cy="3565478"/>
+          </a:xfrm>
+          <a:prstGeom prst="rect">
+            <a:avLst/>
+          </a:prstGeom>
+        </p:spPr>
+      </p:pic>
+      <p:pic>
+        <p:nvPicPr>
+          <p:cNvPr id="7" name="Picture 6" descr="A close up of a map&#10;&#10;Description automatically generated">
+            <a:extLst>
+              <a:ext uri="{FF2B5EF4-FFF2-40B4-BE49-F238E27FC236}">
+                <a16:creationId xmlns:a16="http://schemas.microsoft.com/office/drawing/2014/main" id="{9C55AF6B-FD97-9D4F-B4B0-B4DE67F9239C}"/>
+              </a:ext>
+            </a:extLst>
+          </p:cNvPr>
+          <p:cNvPicPr>
+            <a:picLocks noChangeAspect="1"/>
+          </p:cNvPicPr>
+          <p:nvPr/>
+        </p:nvPicPr>
+        <p:blipFill>
+          <a:blip r:embed="rId3"/>
+          <a:stretch>
+            <a:fillRect/>
+          </a:stretch>
+        </p:blipFill>
+        <p:spPr>
+          <a:xfrm>
+            <a:off x="605651" y="1460209"/>
+            <a:ext cx="5704764" cy="3565478"/>
+          </a:xfrm>
+          <a:prstGeom prst="rect">
+            <a:avLst/>
+          </a:prstGeom>
+        </p:spPr>
+      </p:pic>
     </p:spTree>
     <p:extLst>
       <p:ext uri="{BB962C8B-B14F-4D97-AF65-F5344CB8AC3E}">

</xml_diff>